<commit_message>
Updated sounds animals configuration file and cursor movement controls
</commit_message>
<xml_diff>
--- a/Assets/StreamingAssets/2D_Objects/Farm/Instructions.pptx
+++ b/Assets/StreamingAssets/2D_Objects/Farm/Instructions.pptx
@@ -111,6 +111,11 @@
       </a:defRPr>
     </a:lvl9pPr>
   </p:defaultTextStyle>
+  <p:extLst>
+    <p:ext uri="{EFAFB233-063F-42B5-8137-9DF3F51BA10A}">
+      <p15:sldGuideLst xmlns:p15="http://schemas.microsoft.com/office/powerpoint/2012/main"/>
+    </p:ext>
+  </p:extLst>
 </p:presentation>
 </file>
 
@@ -261,7 +266,7 @@
           <a:p>
             <a:fld id="{C924582D-B4F8-4A2F-8F4E-5936668585D1}" type="datetimeFigureOut">
               <a:rPr lang="en-US" smtClean="0"/>
-              <a:t>6/29/2020</a:t>
+              <a:t>7/3/2020</a:t>
             </a:fld>
             <a:endParaRPr lang="en-US"/>
           </a:p>
@@ -459,7 +464,7 @@
           <a:p>
             <a:fld id="{C924582D-B4F8-4A2F-8F4E-5936668585D1}" type="datetimeFigureOut">
               <a:rPr lang="en-US" smtClean="0"/>
-              <a:t>6/29/2020</a:t>
+              <a:t>7/3/2020</a:t>
             </a:fld>
             <a:endParaRPr lang="en-US"/>
           </a:p>
@@ -667,7 +672,7 @@
           <a:p>
             <a:fld id="{C924582D-B4F8-4A2F-8F4E-5936668585D1}" type="datetimeFigureOut">
               <a:rPr lang="en-US" smtClean="0"/>
-              <a:t>6/29/2020</a:t>
+              <a:t>7/3/2020</a:t>
             </a:fld>
             <a:endParaRPr lang="en-US"/>
           </a:p>
@@ -865,7 +870,7 @@
           <a:p>
             <a:fld id="{C924582D-B4F8-4A2F-8F4E-5936668585D1}" type="datetimeFigureOut">
               <a:rPr lang="en-US" smtClean="0"/>
-              <a:t>6/29/2020</a:t>
+              <a:t>7/3/2020</a:t>
             </a:fld>
             <a:endParaRPr lang="en-US"/>
           </a:p>
@@ -1140,7 +1145,7 @@
           <a:p>
             <a:fld id="{C924582D-B4F8-4A2F-8F4E-5936668585D1}" type="datetimeFigureOut">
               <a:rPr lang="en-US" smtClean="0"/>
-              <a:t>6/29/2020</a:t>
+              <a:t>7/3/2020</a:t>
             </a:fld>
             <a:endParaRPr lang="en-US"/>
           </a:p>
@@ -1405,7 +1410,7 @@
           <a:p>
             <a:fld id="{C924582D-B4F8-4A2F-8F4E-5936668585D1}" type="datetimeFigureOut">
               <a:rPr lang="en-US" smtClean="0"/>
-              <a:t>6/29/2020</a:t>
+              <a:t>7/3/2020</a:t>
             </a:fld>
             <a:endParaRPr lang="en-US"/>
           </a:p>
@@ -1817,7 +1822,7 @@
           <a:p>
             <a:fld id="{C924582D-B4F8-4A2F-8F4E-5936668585D1}" type="datetimeFigureOut">
               <a:rPr lang="en-US" smtClean="0"/>
-              <a:t>6/29/2020</a:t>
+              <a:t>7/3/2020</a:t>
             </a:fld>
             <a:endParaRPr lang="en-US"/>
           </a:p>
@@ -1958,7 +1963,7 @@
           <a:p>
             <a:fld id="{C924582D-B4F8-4A2F-8F4E-5936668585D1}" type="datetimeFigureOut">
               <a:rPr lang="en-US" smtClean="0"/>
-              <a:t>6/29/2020</a:t>
+              <a:t>7/3/2020</a:t>
             </a:fld>
             <a:endParaRPr lang="en-US"/>
           </a:p>
@@ -2071,7 +2076,7 @@
           <a:p>
             <a:fld id="{C924582D-B4F8-4A2F-8F4E-5936668585D1}" type="datetimeFigureOut">
               <a:rPr lang="en-US" smtClean="0"/>
-              <a:t>6/29/2020</a:t>
+              <a:t>7/3/2020</a:t>
             </a:fld>
             <a:endParaRPr lang="en-US"/>
           </a:p>
@@ -2382,7 +2387,7 @@
           <a:p>
             <a:fld id="{C924582D-B4F8-4A2F-8F4E-5936668585D1}" type="datetimeFigureOut">
               <a:rPr lang="en-US" smtClean="0"/>
-              <a:t>6/29/2020</a:t>
+              <a:t>7/3/2020</a:t>
             </a:fld>
             <a:endParaRPr lang="en-US"/>
           </a:p>
@@ -2670,7 +2675,7 @@
           <a:p>
             <a:fld id="{C924582D-B4F8-4A2F-8F4E-5936668585D1}" type="datetimeFigureOut">
               <a:rPr lang="en-US" smtClean="0"/>
-              <a:t>6/29/2020</a:t>
+              <a:t>7/3/2020</a:t>
             </a:fld>
             <a:endParaRPr lang="en-US"/>
           </a:p>
@@ -2911,7 +2916,7 @@
           <a:p>
             <a:fld id="{C924582D-B4F8-4A2F-8F4E-5936668585D1}" type="datetimeFigureOut">
               <a:rPr lang="en-US" smtClean="0"/>
-              <a:t>6/29/2020</a:t>
+              <a:t>7/3/2020</a:t>
             </a:fld>
             <a:endParaRPr lang="en-US"/>
           </a:p>
@@ -4318,12 +4323,12 @@
           <a:lstStyle/>
           <a:p>
             <a:r>
-              <a:rPr lang="en-US" sz="3600">
+              <a:rPr lang="en-US" sz="3600" dirty="0">
                 <a:solidFill>
                   <a:srgbClr val="FFFFFF"/>
                 </a:solidFill>
               </a:rPr>
-              <a:t>Feed the Goat!</a:t>
+              <a:t>Feed the Sheep!</a:t>
             </a:r>
           </a:p>
         </p:txBody>
@@ -4404,10 +4409,10 @@
       </p:sp>
       <p:pic>
         <p:nvPicPr>
-          <p:cNvPr id="4" name="Picture 3">
-            <a:extLst>
-              <a:ext uri="{FF2B5EF4-FFF2-40B4-BE49-F238E27FC236}">
-                <a16:creationId xmlns:a16="http://schemas.microsoft.com/office/drawing/2014/main" id="{3A1B162A-80D5-4934-B8D6-8A63599C3C4A}"/>
+          <p:cNvPr id="3" name="Picture 2">
+            <a:extLst>
+              <a:ext uri="{FF2B5EF4-FFF2-40B4-BE49-F238E27FC236}">
+                <a16:creationId xmlns:a16="http://schemas.microsoft.com/office/drawing/2014/main" id="{0A0D2C23-87CF-44ED-8113-CC2B8532898B}"/>
               </a:ext>
             </a:extLst>
           </p:cNvPr>
@@ -4416,20 +4421,20 @@
           </p:cNvPicPr>
           <p:nvPr/>
         </p:nvPicPr>
-        <p:blipFill rotWithShape="1">
+        <p:blipFill>
           <a:blip r:embed="rId2"/>
-          <a:srcRect t="1391" b="2715"/>
-          <a:stretch/>
+          <a:stretch>
+            <a:fillRect/>
+          </a:stretch>
         </p:blipFill>
         <p:spPr>
           <a:xfrm>
-            <a:off x="976251" y="942538"/>
-            <a:ext cx="7163222" cy="4808332"/>
+            <a:off x="1749599" y="1393466"/>
+            <a:ext cx="5469350" cy="3906476"/>
           </a:xfrm>
           <a:prstGeom prst="rect">
             <a:avLst/>
           </a:prstGeom>
-          <a:effectLst/>
         </p:spPr>
       </p:pic>
     </p:spTree>

</xml_diff>